<commit_message>
Updated slides for 2025
</commit_message>
<xml_diff>
--- a/03/DATA515_03_InterfaceSpecification.pptx
+++ b/03/DATA515_03_InterfaceSpecification.pptx
@@ -7449,7 +7449,7 @@
             </a:pPr>
             <a:r>
               <a:rPr lang="en"/>
-              <a:t>January 18, 2024</a:t>
+              <a:t>January 23, 2025</a:t>
             </a:r>
             <a:endParaRPr/>
           </a:p>
@@ -7966,7 +7966,7 @@
             </a:pPr>
             <a:r>
               <a:rPr lang="en"/>
-              <a:t>		… next week</a:t>
+              <a:t>		… in a few weeks</a:t>
             </a:r>
             <a:endParaRPr/>
           </a:p>

</xml_diff>